<commit_message>
slide tweaks when recording screencast
</commit_message>
<xml_diff>
--- a/01 intro.pptx
+++ b/01 intro.pptx
@@ -281,7 +281,7 @@
               <a:rPr lang="en-US" smtClean="0">
                 <a:latin typeface="Segoe UI" pitchFamily="34" charset="0"/>
               </a:rPr>
-              <a:t>10/5/18 6:09 AM</a:t>
+              <a:t>10/9/18 5:51 AM</a:t>
             </a:fld>
             <a:endParaRPr lang="en-US" dirty="0">
               <a:latin typeface="Segoe UI" pitchFamily="34" charset="0"/>
@@ -575,7 +575,7 @@
           <a:p>
             <a:fld id="{D18B56EA-E28F-4F92-9F16-7A6F2501B303}" type="datetime8">
               <a:rPr lang="en-US" smtClean="0"/>
-              <a:t>10/5/18 6:09 AM</a:t>
+              <a:t>10/9/18 5:51 AM</a:t>
             </a:fld>
             <a:endParaRPr lang="en-US" dirty="0"/>
           </a:p>
@@ -958,7 +958,7 @@
           <a:p>
             <a:fld id="{D18B56EA-E28F-4F92-9F16-7A6F2501B303}" type="datetime8">
               <a:rPr lang="en-US" smtClean="0"/>
-              <a:t>10/5/18 6:24 AM</a:t>
+              <a:t>10/9/18 5:51 AM</a:t>
             </a:fld>
             <a:endParaRPr lang="en-US" dirty="0"/>
           </a:p>
@@ -1139,7 +1139,7 @@
           <a:p>
             <a:fld id="{D18B56EA-E28F-4F92-9F16-7A6F2501B303}" type="datetime8">
               <a:rPr lang="en-US" smtClean="0"/>
-              <a:t>10/5/18 6:25 AM</a:t>
+              <a:t>10/9/18 5:51 AM</a:t>
             </a:fld>
             <a:endParaRPr lang="en-US" dirty="0"/>
           </a:p>
@@ -1320,7 +1320,7 @@
           <a:p>
             <a:fld id="{D18B56EA-E28F-4F92-9F16-7A6F2501B303}" type="datetime8">
               <a:rPr lang="en-US" smtClean="0"/>
-              <a:t>10/5/18 6:25 AM</a:t>
+              <a:t>10/9/18 5:51 AM</a:t>
             </a:fld>
             <a:endParaRPr lang="en-US" dirty="0"/>
           </a:p>
@@ -1501,7 +1501,7 @@
           <a:p>
             <a:fld id="{D18B56EA-E28F-4F92-9F16-7A6F2501B303}" type="datetime8">
               <a:rPr lang="en-US" smtClean="0"/>
-              <a:t>10/5/18 6:15 AM</a:t>
+              <a:t>10/9/18 5:51 AM</a:t>
             </a:fld>
             <a:endParaRPr lang="en-US" dirty="0"/>
           </a:p>
@@ -1682,7 +1682,7 @@
           <a:p>
             <a:fld id="{D18B56EA-E28F-4F92-9F16-7A6F2501B303}" type="datetime8">
               <a:rPr lang="en-US" smtClean="0"/>
-              <a:t>10/5/18 6:15 AM</a:t>
+              <a:t>10/9/18 5:51 AM</a:t>
             </a:fld>
             <a:endParaRPr lang="en-US" dirty="0"/>
           </a:p>
@@ -1863,7 +1863,7 @@
           <a:p>
             <a:fld id="{D18B56EA-E28F-4F92-9F16-7A6F2501B303}" type="datetime8">
               <a:rPr lang="en-US" smtClean="0"/>
-              <a:t>10/5/18 6:25 AM</a:t>
+              <a:t>10/9/18 5:51 AM</a:t>
             </a:fld>
             <a:endParaRPr lang="en-US" dirty="0"/>
           </a:p>
@@ -19814,7 +19814,7 @@
         <p:spPr>
           <a:xfrm>
             <a:off x="274638" y="1212850"/>
-            <a:ext cx="11887200" cy="5576911"/>
+            <a:ext cx="11887200" cy="4838248"/>
           </a:xfrm>
         </p:spPr>
         <p:txBody>
@@ -19823,56 +19823,57 @@
           <a:p>
             <a:r>
               <a:rPr lang="en-US" altLang="zh-CN" sz="2400" dirty="0"/>
-              <a:t>clean</a:t>
+              <a:t>clean:</a:t>
             </a:r>
             <a:r>
               <a:rPr lang="en-US" sz="2400" dirty="0"/>
-              <a:t> - deletes SharePoint Framework build folders and intermediate Sass </a:t>
-            </a:r>
-            <a:br>
+              <a:t> deletes temp folders created by build process (</a:t>
+            </a:r>
+            <a:r>
+              <a:rPr lang="en-US" sz="2400" dirty="0" err="1"/>
+              <a:t>ie</a:t>
+            </a:r>
+            <a:r>
               <a:rPr lang="en-US" sz="2400" dirty="0"/>
-            </a:br>
+              <a:t>: </a:t>
+            </a:r>
+            <a:r>
+              <a:rPr lang="en-US" sz="2400" dirty="0" err="1"/>
+              <a:t>dist</a:t>
+            </a:r>
             <a:r>
               <a:rPr lang="en-US" sz="2400" dirty="0"/>
-              <a:t>files in the </a:t>
-            </a:r>
-            <a:r>
-              <a:rPr lang="en-US" sz="2400" dirty="0" err="1"/>
-              <a:t>src</a:t>
-            </a:r>
+              <a:t>, lib, temp)</a:t>
+            </a:r>
+          </a:p>
+          <a:p>
             <a:r>
               <a:rPr lang="en-US" sz="2400" dirty="0"/>
-              <a:t> folder</a:t>
+              <a:t>build: build the project</a:t>
             </a:r>
           </a:p>
           <a:p>
             <a:r>
               <a:rPr lang="en-US" sz="2400" dirty="0"/>
-              <a:t>build - build the project</a:t>
+              <a:t>default: equivalent to bundle</a:t>
             </a:r>
           </a:p>
           <a:p>
             <a:r>
               <a:rPr lang="en-US" sz="2400" dirty="0"/>
-              <a:t>default - equivalent to bundle</a:t>
+              <a:t>bundle: build, localize, and bundle the project</a:t>
             </a:r>
           </a:p>
           <a:p>
             <a:r>
               <a:rPr lang="en-US" sz="2400" dirty="0"/>
-              <a:t>bundle - build, localize, and bundle the project</a:t>
+              <a:t>dev-deploy: deploy the current project to a development Azure CDN for sharing builds with colleagues</a:t>
             </a:r>
           </a:p>
           <a:p>
             <a:r>
               <a:rPr lang="en-US" sz="2400" dirty="0"/>
-              <a:t>dev-deploy - deploy the current project to a development Azure CDN for sharing builds with colleagues</a:t>
-            </a:r>
-          </a:p>
-          <a:p>
-            <a:r>
-              <a:rPr lang="en-US" sz="2400" dirty="0"/>
-              <a:t>deploy-azure-storage - upload the assets to a </a:t>
+              <a:t>deploy-azure-storage: upload the assets to a </a:t>
             </a:r>
             <a:r>
               <a:rPr lang="en-US" altLang="zh-CN" sz="2400" dirty="0"/>
@@ -19891,35 +19892,33 @@
           <a:p>
             <a:r>
               <a:rPr lang="en-US" sz="2400" dirty="0"/>
-              <a:t>package-solution - package the project into a SPPKG</a:t>
+              <a:t>package-solution: package the project into a SPPKG</a:t>
             </a:r>
           </a:p>
           <a:p>
             <a:r>
               <a:rPr lang="en-US" sz="2400" dirty="0"/>
-              <a:t>test - build, localize, and bundle the project and run tests, and verify the coverage</a:t>
+              <a:t>test: build, localize, and bundle the project and run tests, and verify the coverage</a:t>
             </a:r>
           </a:p>
           <a:p>
             <a:r>
               <a:rPr lang="en-US" sz="2400" dirty="0"/>
-              <a:t>serve - build and bundle the project and run the development server</a:t>
+              <a:t>serve: build and bundle the project and run the development server</a:t>
             </a:r>
           </a:p>
           <a:p>
             <a:r>
               <a:rPr lang="en-US" sz="2400" dirty="0"/>
-              <a:t>trust-dev-cert - generates and trusts a development certificate if one isn't already present</a:t>
-            </a:r>
-          </a:p>
-          <a:p>
+              <a:t>trust-dev-cert &amp; </a:t>
+            </a:r>
             <a:r>
               <a:rPr lang="en-US" sz="2400" dirty="0" err="1"/>
               <a:t>untrust</a:t>
             </a:r>
             <a:r>
               <a:rPr lang="en-US" sz="2400" dirty="0"/>
-              <a:t>-dev-cert - </a:t>
+              <a:t>-dev-cert: trusts / </a:t>
             </a:r>
             <a:r>
               <a:rPr lang="en-US" sz="2400" dirty="0" err="1"/>
@@ -19927,7 +19926,7 @@
             </a:r>
             <a:r>
               <a:rPr lang="en-US" sz="2400" dirty="0"/>
-              <a:t> and deletes the development certificate if it exists</a:t>
+              <a:t> the development SSL certificate in the local machine’s trusted root authority (self-hosted HTTPS site)</a:t>
             </a:r>
           </a:p>
         </p:txBody>
@@ -20110,7 +20109,7 @@
         <p:spPr>
           <a:xfrm>
             <a:off x="274638" y="1212850"/>
-            <a:ext cx="11887200" cy="4727448"/>
+            <a:ext cx="11887200" cy="5835444"/>
           </a:xfrm>
         </p:spPr>
         <p:txBody>
@@ -20148,7 +20147,29 @@
           <a:p>
             <a:r>
               <a:rPr lang="en-US" dirty="0"/>
-              <a:t>JavaScript files, CSS and other assets are not packaged, they must be deployed to an external location such as a CDN</a:t>
+              <a:t>JavaScript files, CSS and other assets are not packaged, they must be deployed to an external location such as a CDN*</a:t>
+            </a:r>
+          </a:p>
+          <a:p>
+            <a:r>
+              <a:rPr lang="en-US" dirty="0"/>
+              <a:t>“</a:t>
+            </a:r>
+            <a:r>
+              <a:rPr lang="en-US" dirty="0" err="1"/>
+              <a:t>includeClientAssets</a:t>
+            </a:r>
+            <a:r>
+              <a:rPr lang="en-US" dirty="0"/>
+              <a:t>: true” changed this default behavior to include components in the *.</a:t>
+            </a:r>
+            <a:r>
+              <a:rPr lang="en-US" dirty="0" err="1"/>
+              <a:t>sppkg</a:t>
+            </a:r>
+            <a:r>
+              <a:rPr lang="en-US" dirty="0"/>
+              <a:t> file</a:t>
             </a:r>
           </a:p>
         </p:txBody>
@@ -25157,7 +25178,7 @@
         <p:spPr>
           <a:xfrm>
             <a:off x="274638" y="1212850"/>
-            <a:ext cx="7895585" cy="4949047"/>
+            <a:ext cx="7895585" cy="4616648"/>
           </a:xfrm>
         </p:spPr>
         <p:txBody>
@@ -25169,7 +25190,7 @@
               <a:t>.</a:t>
             </a:r>
             <a:r>
-              <a:rPr lang="en-US" sz="2400" b="1" dirty="0" err="1"/>
+              <a:rPr lang="en-US" sz="2400" dirty="0" err="1"/>
               <a:t>vscode</a:t>
             </a:r>
             <a:r>
@@ -25183,24 +25204,28 @@
           </a:p>
           <a:p>
             <a:r>
+              <a:rPr lang="en-US" sz="2400" b="1" dirty="0"/>
+              <a:t>config</a:t>
+            </a:r>
+            <a:r>
               <a:rPr lang="en-US" sz="2400" dirty="0"/>
-              <a:t>config: includes all config files</a:t>
-            </a:r>
-          </a:p>
-          <a:p>
-            <a:r>
-              <a:rPr lang="en-US" sz="2400" dirty="0" err="1"/>
+              <a:t>: includes all config files</a:t>
+            </a:r>
+          </a:p>
+          <a:p>
+            <a:r>
+              <a:rPr lang="en-US" sz="2400" b="1" dirty="0" err="1"/>
               <a:t>dist</a:t>
             </a:r>
             <a:r>
               <a:rPr lang="en-US" sz="2400" dirty="0"/>
-              <a:t>: created automatically when you build the project – holds debug builds</a:t>
+              <a:t>: created automatically on builds – contains out from bundle process</a:t>
             </a:r>
           </a:p>
           <a:p>
             <a:r>
               <a:rPr lang="en-US" sz="2400" dirty="0"/>
-              <a:t>lib: created automatically when you build the project </a:t>
+              <a:t>lib: created automatically on builds – contains pre-bundled built files</a:t>
             </a:r>
           </a:p>
           <a:p>
@@ -25210,15 +25235,7 @@
             </a:r>
             <a:r>
               <a:rPr lang="en-US" sz="2400" dirty="0"/>
-              <a:t>: this is created automatically when you build your project, it includes all the </a:t>
-            </a:r>
-            <a:r>
-              <a:rPr lang="en-US" sz="2400" dirty="0" err="1"/>
-              <a:t>npm</a:t>
-            </a:r>
-            <a:r>
-              <a:rPr lang="en-US" sz="2400" dirty="0"/>
-              <a:t> packages your solution relies upon and their dependencies</a:t>
+              <a:t>: created automatically when installing all package dependencies with a package manager</a:t>
             </a:r>
           </a:p>
           <a:p>
@@ -25234,7 +25251,7 @@
           <a:p>
             <a:r>
               <a:rPr lang="en-US" sz="2400" dirty="0"/>
-              <a:t>temp: created automatically when you build your project – holds production builds</a:t>
+              <a:t>temp: created automatically on builds - contains local dev webserver files</a:t>
             </a:r>
           </a:p>
         </p:txBody>

</xml_diff>

<commit_message>
Fix typo and link in Intro slide deck
</commit_message>
<xml_diff>
--- a/01 intro.pptx
+++ b/01 intro.pptx
@@ -281,7 +281,7 @@
               <a:rPr lang="en-US" smtClean="0">
                 <a:latin typeface="Segoe UI" pitchFamily="34" charset="0"/>
               </a:rPr>
-              <a:t>10/9/18 5:51 AM</a:t>
+              <a:t>12/17/2018 2:24 PM</a:t>
             </a:fld>
             <a:endParaRPr lang="en-US" dirty="0">
               <a:latin typeface="Segoe UI" pitchFamily="34" charset="0"/>
@@ -575,7 +575,7 @@
           <a:p>
             <a:fld id="{D18B56EA-E28F-4F92-9F16-7A6F2501B303}" type="datetime8">
               <a:rPr lang="en-US" smtClean="0"/>
-              <a:t>10/9/18 5:51 AM</a:t>
+              <a:t>12/17/2018 2:24 PM</a:t>
             </a:fld>
             <a:endParaRPr lang="en-US" dirty="0"/>
           </a:p>
@@ -958,7 +958,7 @@
           <a:p>
             <a:fld id="{D18B56EA-E28F-4F92-9F16-7A6F2501B303}" type="datetime8">
               <a:rPr lang="en-US" smtClean="0"/>
-              <a:t>10/9/18 5:51 AM</a:t>
+              <a:t>12/17/2018 2:24 PM</a:t>
             </a:fld>
             <a:endParaRPr lang="en-US" dirty="0"/>
           </a:p>
@@ -1139,7 +1139,7 @@
           <a:p>
             <a:fld id="{D18B56EA-E28F-4F92-9F16-7A6F2501B303}" type="datetime8">
               <a:rPr lang="en-US" smtClean="0"/>
-              <a:t>10/9/18 5:51 AM</a:t>
+              <a:t>12/17/2018 2:24 PM</a:t>
             </a:fld>
             <a:endParaRPr lang="en-US" dirty="0"/>
           </a:p>
@@ -1320,7 +1320,7 @@
           <a:p>
             <a:fld id="{D18B56EA-E28F-4F92-9F16-7A6F2501B303}" type="datetime8">
               <a:rPr lang="en-US" smtClean="0"/>
-              <a:t>10/9/18 5:51 AM</a:t>
+              <a:t>12/17/2018 2:32 PM</a:t>
             </a:fld>
             <a:endParaRPr lang="en-US" dirty="0"/>
           </a:p>
@@ -1501,7 +1501,7 @@
           <a:p>
             <a:fld id="{D18B56EA-E28F-4F92-9F16-7A6F2501B303}" type="datetime8">
               <a:rPr lang="en-US" smtClean="0"/>
-              <a:t>10/9/18 5:51 AM</a:t>
+              <a:t>12/17/2018 2:24 PM</a:t>
             </a:fld>
             <a:endParaRPr lang="en-US" dirty="0"/>
           </a:p>
@@ -1682,7 +1682,7 @@
           <a:p>
             <a:fld id="{D18B56EA-E28F-4F92-9F16-7A6F2501B303}" type="datetime8">
               <a:rPr lang="en-US" smtClean="0"/>
-              <a:t>10/9/18 5:51 AM</a:t>
+              <a:t>12/17/2018 2:24 PM</a:t>
             </a:fld>
             <a:endParaRPr lang="en-US" dirty="0"/>
           </a:p>
@@ -1863,7 +1863,7 @@
           <a:p>
             <a:fld id="{D18B56EA-E28F-4F92-9F16-7A6F2501B303}" type="datetime8">
               <a:rPr lang="en-US" smtClean="0"/>
-              <a:t>10/9/18 5:51 AM</a:t>
+              <a:t>12/17/2018 2:24 PM</a:t>
             </a:fld>
             <a:endParaRPr lang="en-US" dirty="0"/>
           </a:p>
@@ -24708,7 +24708,7 @@
                 <a:latin typeface="+mj-lt"/>
                 <a:hlinkClick r:id="rId3"/>
               </a:rPr>
-              <a:t>https://docs.microsoft.com/sharepoint/dev/spfx</a:t>
+              <a:t>https://docs.microsoft.com/en-us/sharepoint/dev/spfx/sharepoint-framework-overview</a:t>
             </a:r>
             <a:endParaRPr lang="en-US" sz="1800" dirty="0">
               <a:latin typeface="+mj-lt"/>
@@ -25381,7 +25381,7 @@
           <a:p>
             <a:r>
               <a:rPr lang="en-US" sz="2400" dirty="0"/>
-              <a:t>All client-side webs part must extend the </a:t>
+              <a:t>All client-side web parts must extend the </a:t>
             </a:r>
             <a:r>
               <a:rPr lang="en-US" sz="2400" dirty="0" err="1"/>

</xml_diff>